<commit_message>
commit with powerpoint pdf export
</commit_message>
<xml_diff>
--- a/pdf_report_generator/report_templates/vcp_report_template.pptx
+++ b/pdf_report_generator/report_templates/vcp_report_template.pptx
@@ -243,7 +243,7 @@
           <a:p>
             <a:fld id="{095D53EE-5E6F-49D2-B6D2-2CF35DAEFBA8}" type="datetimeFigureOut">
               <a:rPr lang="en-CA" smtClean="0"/>
-              <a:t>2022-04-27</a:t>
+              <a:t>2022-04-28</a:t>
             </a:fld>
             <a:endParaRPr lang="en-CA"/>
           </a:p>
@@ -413,7 +413,7 @@
           <a:p>
             <a:fld id="{095D53EE-5E6F-49D2-B6D2-2CF35DAEFBA8}" type="datetimeFigureOut">
               <a:rPr lang="en-CA" smtClean="0"/>
-              <a:t>2022-04-27</a:t>
+              <a:t>2022-04-28</a:t>
             </a:fld>
             <a:endParaRPr lang="en-CA"/>
           </a:p>
@@ -593,7 +593,7 @@
           <a:p>
             <a:fld id="{095D53EE-5E6F-49D2-B6D2-2CF35DAEFBA8}" type="datetimeFigureOut">
               <a:rPr lang="en-CA" smtClean="0"/>
-              <a:t>2022-04-27</a:t>
+              <a:t>2022-04-28</a:t>
             </a:fld>
             <a:endParaRPr lang="en-CA"/>
           </a:p>
@@ -763,7 +763,7 @@
           <a:p>
             <a:fld id="{095D53EE-5E6F-49D2-B6D2-2CF35DAEFBA8}" type="datetimeFigureOut">
               <a:rPr lang="en-CA" smtClean="0"/>
-              <a:t>2022-04-27</a:t>
+              <a:t>2022-04-28</a:t>
             </a:fld>
             <a:endParaRPr lang="en-CA"/>
           </a:p>
@@ -1007,7 +1007,7 @@
           <a:p>
             <a:fld id="{095D53EE-5E6F-49D2-B6D2-2CF35DAEFBA8}" type="datetimeFigureOut">
               <a:rPr lang="en-CA" smtClean="0"/>
-              <a:t>2022-04-27</a:t>
+              <a:t>2022-04-28</a:t>
             </a:fld>
             <a:endParaRPr lang="en-CA"/>
           </a:p>
@@ -1239,7 +1239,7 @@
           <a:p>
             <a:fld id="{095D53EE-5E6F-49D2-B6D2-2CF35DAEFBA8}" type="datetimeFigureOut">
               <a:rPr lang="en-CA" smtClean="0"/>
-              <a:t>2022-04-27</a:t>
+              <a:t>2022-04-28</a:t>
             </a:fld>
             <a:endParaRPr lang="en-CA"/>
           </a:p>
@@ -1606,7 +1606,7 @@
           <a:p>
             <a:fld id="{095D53EE-5E6F-49D2-B6D2-2CF35DAEFBA8}" type="datetimeFigureOut">
               <a:rPr lang="en-CA" smtClean="0"/>
-              <a:t>2022-04-27</a:t>
+              <a:t>2022-04-28</a:t>
             </a:fld>
             <a:endParaRPr lang="en-CA"/>
           </a:p>
@@ -1724,7 +1724,7 @@
           <a:p>
             <a:fld id="{095D53EE-5E6F-49D2-B6D2-2CF35DAEFBA8}" type="datetimeFigureOut">
               <a:rPr lang="en-CA" smtClean="0"/>
-              <a:t>2022-04-27</a:t>
+              <a:t>2022-04-28</a:t>
             </a:fld>
             <a:endParaRPr lang="en-CA"/>
           </a:p>
@@ -1819,7 +1819,7 @@
           <a:p>
             <a:fld id="{095D53EE-5E6F-49D2-B6D2-2CF35DAEFBA8}" type="datetimeFigureOut">
               <a:rPr lang="en-CA" smtClean="0"/>
-              <a:t>2022-04-27</a:t>
+              <a:t>2022-04-28</a:t>
             </a:fld>
             <a:endParaRPr lang="en-CA"/>
           </a:p>
@@ -2096,7 +2096,7 @@
           <a:p>
             <a:fld id="{095D53EE-5E6F-49D2-B6D2-2CF35DAEFBA8}" type="datetimeFigureOut">
               <a:rPr lang="en-CA" smtClean="0"/>
-              <a:t>2022-04-27</a:t>
+              <a:t>2022-04-28</a:t>
             </a:fld>
             <a:endParaRPr lang="en-CA"/>
           </a:p>
@@ -2353,7 +2353,7 @@
           <a:p>
             <a:fld id="{095D53EE-5E6F-49D2-B6D2-2CF35DAEFBA8}" type="datetimeFigureOut">
               <a:rPr lang="en-CA" smtClean="0"/>
-              <a:t>2022-04-27</a:t>
+              <a:t>2022-04-28</a:t>
             </a:fld>
             <a:endParaRPr lang="en-CA"/>
           </a:p>
@@ -2566,7 +2566,7 @@
           <a:p>
             <a:fld id="{095D53EE-5E6F-49D2-B6D2-2CF35DAEFBA8}" type="datetimeFigureOut">
               <a:rPr lang="en-CA" smtClean="0"/>
-              <a:t>2022-04-27</a:t>
+              <a:t>2022-04-28</a:t>
             </a:fld>
             <a:endParaRPr lang="en-CA"/>
           </a:p>
@@ -3000,7 +3000,10 @@
                 <a14:imgProps xmlns:a14="http://schemas.microsoft.com/office/drawing/2010/main">
                   <a14:imgLayer r:embed="rId3">
                     <a14:imgEffect>
-                      <a14:brightnessContrast bright="-40000"/>
+                      <a14:sharpenSoften amount="-25000"/>
+                    </a14:imgEffect>
+                    <a14:imgEffect>
+                      <a14:brightnessContrast bright="-40000" contrast="20000"/>
                     </a14:imgEffect>
                   </a14:imgLayer>
                 </a14:imgProps>
@@ -3015,7 +3018,7 @@
         </p:blipFill>
         <p:spPr bwMode="auto">
           <a:xfrm>
-            <a:off x="-1" y="10"/>
+            <a:off x="0" y="0"/>
             <a:ext cx="6858001" cy="6864278"/>
           </a:xfrm>
           <a:prstGeom prst="rect">
@@ -3080,51 +3083,6 @@
       </p:pic>
       <p:sp>
         <p:nvSpPr>
-          <p:cNvPr id="4" name="Title 3">
-            <a:extLst>
-              <a:ext uri="{FF2B5EF4-FFF2-40B4-BE49-F238E27FC236}">
-                <a16:creationId xmlns:a16="http://schemas.microsoft.com/office/drawing/2014/main" id="{5E976AD0-0FD1-440C-A25B-91F540E5919C}"/>
-              </a:ext>
-            </a:extLst>
-          </p:cNvPr>
-          <p:cNvSpPr>
-            <a:spLocks noGrp="1"/>
-          </p:cNvSpPr>
-          <p:nvPr>
-            <p:ph type="ctrTitle"/>
-          </p:nvPr>
-        </p:nvSpPr>
-        <p:spPr>
-          <a:xfrm>
-            <a:off x="278053" y="7801691"/>
-            <a:ext cx="3689790" cy="1060255"/>
-          </a:xfrm>
-        </p:spPr>
-        <p:txBody>
-          <a:bodyPr anchor="t">
-            <a:normAutofit/>
-          </a:bodyPr>
-          <a:lstStyle/>
-          <a:p>
-            <a:pPr algn="l"/>
-            <a:r>
-              <a:rPr lang="en-US" sz="3200" dirty="0">
-                <a:solidFill>
-                  <a:srgbClr val="000000"/>
-                </a:solidFill>
-              </a:rPr>
-              <a:t>Disclaimer goes here</a:t>
-            </a:r>
-            <a:endParaRPr lang="en-CA" sz="3200" dirty="0">
-              <a:solidFill>
-                <a:srgbClr val="000000"/>
-              </a:solidFill>
-            </a:endParaRPr>
-          </a:p>
-        </p:txBody>
-      </p:sp>
-      <p:sp>
-        <p:nvSpPr>
           <p:cNvPr id="5" name="Subtitle 4">
             <a:extLst>
               <a:ext uri="{FF2B5EF4-FFF2-40B4-BE49-F238E27FC236}">
@@ -3141,21 +3099,20 @@
         </p:nvSpPr>
         <p:spPr>
           <a:xfrm>
-            <a:off x="299310" y="6914596"/>
-            <a:ext cx="5312266" cy="605042"/>
+            <a:off x="1622501" y="2739086"/>
+            <a:ext cx="3612995" cy="605042"/>
           </a:xfrm>
         </p:spPr>
         <p:txBody>
           <a:bodyPr anchor="b">
-            <a:normAutofit/>
+            <a:noAutofit/>
           </a:bodyPr>
           <a:lstStyle/>
           <a:p>
-            <a:pPr algn="l"/>
-            <a:r>
-              <a:rPr lang="en-US" altLang="zh-TW" b="1" i="0" dirty="0">
+            <a:r>
+              <a:rPr lang="en-US" altLang="zh-TW" sz="3200" b="1" i="0" dirty="0">
                 <a:solidFill>
-                  <a:srgbClr val="000000"/>
+                  <a:schemeClr val="bg1"/>
                 </a:solidFill>
                 <a:effectLst/>
                 <a:latin typeface="Segoe UI Historic" panose="020B0502040204020203" pitchFamily="34" charset="0"/>
@@ -3163,38 +3120,18 @@
               <a:t>VCP </a:t>
             </a:r>
             <a:r>
-              <a:rPr lang="zh-TW" altLang="en-US" b="1" i="0" dirty="0">
+              <a:rPr lang="zh-TW" altLang="en-US" sz="3200" b="1" i="0" dirty="0">
                 <a:solidFill>
-                  <a:srgbClr val="000000"/>
+                  <a:schemeClr val="bg1"/>
                 </a:solidFill>
                 <a:effectLst/>
                 <a:latin typeface="Segoe UI Historic" panose="020B0502040204020203" pitchFamily="34" charset="0"/>
               </a:rPr>
-              <a:t>全職交易精英 </a:t>
-            </a:r>
-            <a:r>
-              <a:rPr lang="en-US" altLang="zh-TW" b="1" i="0" dirty="0">
-                <a:solidFill>
-                  <a:srgbClr val="000000"/>
-                </a:solidFill>
-                <a:effectLst/>
-                <a:latin typeface="Segoe UI Historic" panose="020B0502040204020203" pitchFamily="34" charset="0"/>
-              </a:rPr>
-              <a:t>- </a:t>
-            </a:r>
-            <a:r>
-              <a:rPr lang="zh-TW" altLang="en-US" b="1" i="0" dirty="0">
-                <a:solidFill>
-                  <a:srgbClr val="000000"/>
-                </a:solidFill>
-                <a:effectLst/>
-                <a:latin typeface="Segoe UI Historic" panose="020B0502040204020203" pitchFamily="34" charset="0"/>
-              </a:rPr>
-              <a:t>專頁</a:t>
-            </a:r>
-            <a:endParaRPr lang="en-CA" dirty="0">
+              <a:t>全職交易精英</a:t>
+            </a:r>
+            <a:endParaRPr lang="en-CA" sz="3200" dirty="0">
               <a:solidFill>
-                <a:srgbClr val="000000"/>
+                <a:schemeClr val="bg1"/>
               </a:solidFill>
             </a:endParaRPr>
           </a:p>
@@ -3214,8 +3151,8 @@
         </p:nvSpPr>
         <p:spPr>
           <a:xfrm>
-            <a:off x="4114800" y="8621486"/>
-            <a:ext cx="2465147" cy="240460"/>
+            <a:off x="1884555" y="3811327"/>
+            <a:ext cx="3088888" cy="246221"/>
           </a:xfrm>
           <a:prstGeom prst="rect">
             <a:avLst/>
@@ -3228,7 +3165,232 @@
           </a:bodyPr>
           <a:lstStyle/>
           <a:p>
-            <a:endParaRPr lang="en-CA" sz="1100" dirty="0"/>
+            <a:pPr algn="ctr"/>
+            <a:endParaRPr lang="en-CA" sz="1000" dirty="0">
+              <a:solidFill>
+                <a:schemeClr val="bg1"/>
+              </a:solidFill>
+            </a:endParaRPr>
+          </a:p>
+        </p:txBody>
+      </p:sp>
+      <p:pic>
+        <p:nvPicPr>
+          <p:cNvPr id="3" name="Picture 2" descr="Patreon Logo and symbol, meaning, history, PNG">
+            <a:hlinkClick r:id="rId5"/>
+            <a:extLst>
+              <a:ext uri="{FF2B5EF4-FFF2-40B4-BE49-F238E27FC236}">
+                <a16:creationId xmlns:a16="http://schemas.microsoft.com/office/drawing/2014/main" id="{19EDD9D2-2389-4A0E-9996-F3081E2F144B}"/>
+              </a:ext>
+            </a:extLst>
+          </p:cNvPr>
+          <p:cNvPicPr>
+            <a:picLocks noChangeAspect="1" noChangeArrowheads="1"/>
+          </p:cNvPicPr>
+          <p:nvPr/>
+        </p:nvPicPr>
+        <p:blipFill>
+          <a:blip r:embed="rId6">
+            <a:extLst>
+              <a:ext uri="{28A0092B-C50C-407E-A947-70E740481C1C}">
+                <a14:useLocalDpi xmlns:a14="http://schemas.microsoft.com/office/drawing/2010/main" val="0"/>
+              </a:ext>
+            </a:extLst>
+          </a:blip>
+          <a:srcRect/>
+          <a:stretch>
+            <a:fillRect/>
+          </a:stretch>
+        </p:blipFill>
+        <p:spPr bwMode="auto">
+          <a:xfrm>
+            <a:off x="4690063" y="7106412"/>
+            <a:ext cx="2049434" cy="1152806"/>
+          </a:xfrm>
+          <a:prstGeom prst="rect">
+            <a:avLst/>
+          </a:prstGeom>
+          <a:noFill/>
+          <a:extLst>
+            <a:ext uri="{909E8E84-426E-40DD-AFC4-6F175D3DCCD1}">
+              <a14:hiddenFill xmlns:a14="http://schemas.microsoft.com/office/drawing/2010/main">
+                <a:solidFill>
+                  <a:srgbClr val="FFFFFF"/>
+                </a:solidFill>
+              </a14:hiddenFill>
+            </a:ext>
+          </a:extLst>
+        </p:spPr>
+      </p:pic>
+      <p:pic>
+        <p:nvPicPr>
+          <p:cNvPr id="1028" name="Picture 4" descr="Facebook logo and symbol, meaning, history, PNG">
+            <a:hlinkClick r:id="rId7"/>
+            <a:extLst>
+              <a:ext uri="{FF2B5EF4-FFF2-40B4-BE49-F238E27FC236}">
+                <a16:creationId xmlns:a16="http://schemas.microsoft.com/office/drawing/2014/main" id="{BC412C63-1915-45F1-8619-AA9D1A44D2D9}"/>
+              </a:ext>
+            </a:extLst>
+          </p:cNvPr>
+          <p:cNvPicPr>
+            <a:picLocks noChangeAspect="1" noChangeArrowheads="1"/>
+          </p:cNvPicPr>
+          <p:nvPr/>
+        </p:nvPicPr>
+        <p:blipFill>
+          <a:blip r:embed="rId8">
+            <a:extLst>
+              <a:ext uri="{28A0092B-C50C-407E-A947-70E740481C1C}">
+                <a14:useLocalDpi xmlns:a14="http://schemas.microsoft.com/office/drawing/2010/main" val="0"/>
+              </a:ext>
+            </a:extLst>
+          </a:blip>
+          <a:srcRect/>
+          <a:stretch>
+            <a:fillRect/>
+          </a:stretch>
+        </p:blipFill>
+        <p:spPr bwMode="auto">
+          <a:xfrm>
+            <a:off x="2310275" y="6869810"/>
+            <a:ext cx="2261286" cy="1413304"/>
+          </a:xfrm>
+          <a:prstGeom prst="rect">
+            <a:avLst/>
+          </a:prstGeom>
+          <a:noFill/>
+          <a:extLst>
+            <a:ext uri="{909E8E84-426E-40DD-AFC4-6F175D3DCCD1}">
+              <a14:hiddenFill xmlns:a14="http://schemas.microsoft.com/office/drawing/2010/main">
+                <a:solidFill>
+                  <a:srgbClr val="FFFFFF"/>
+                </a:solidFill>
+              </a14:hiddenFill>
+            </a:ext>
+          </a:extLst>
+        </p:spPr>
+      </p:pic>
+      <p:pic>
+        <p:nvPicPr>
+          <p:cNvPr id="7" name="Picture 6" descr="Qr code&#10;&#10;Description automatically generated">
+            <a:extLst>
+              <a:ext uri="{FF2B5EF4-FFF2-40B4-BE49-F238E27FC236}">
+                <a16:creationId xmlns:a16="http://schemas.microsoft.com/office/drawing/2014/main" id="{0A7FC310-B394-47D7-8671-E411155ACBF0}"/>
+              </a:ext>
+            </a:extLst>
+          </p:cNvPr>
+          <p:cNvPicPr>
+            <a:picLocks noChangeAspect="1"/>
+          </p:cNvPicPr>
+          <p:nvPr/>
+        </p:nvPicPr>
+        <p:blipFill>
+          <a:blip r:embed="rId9">
+            <a:extLst>
+              <a:ext uri="{28A0092B-C50C-407E-A947-70E740481C1C}">
+                <a14:useLocalDpi xmlns:a14="http://schemas.microsoft.com/office/drawing/2010/main" val="0"/>
+              </a:ext>
+            </a:extLst>
+          </a:blip>
+          <a:stretch>
+            <a:fillRect/>
+          </a:stretch>
+        </p:blipFill>
+        <p:spPr>
+          <a:xfrm>
+            <a:off x="149653" y="6700174"/>
+            <a:ext cx="1578785" cy="1813924"/>
+          </a:xfrm>
+          <a:prstGeom prst="rect">
+            <a:avLst/>
+          </a:prstGeom>
+        </p:spPr>
+      </p:pic>
+      <p:sp>
+        <p:nvSpPr>
+          <p:cNvPr id="4" name="Title 3">
+            <a:extLst>
+              <a:ext uri="{FF2B5EF4-FFF2-40B4-BE49-F238E27FC236}">
+                <a16:creationId xmlns:a16="http://schemas.microsoft.com/office/drawing/2014/main" id="{5E976AD0-0FD1-440C-A25B-91F540E5919C}"/>
+              </a:ext>
+            </a:extLst>
+          </p:cNvPr>
+          <p:cNvSpPr>
+            <a:spLocks noGrp="1"/>
+          </p:cNvSpPr>
+          <p:nvPr>
+            <p:ph type="ctrTitle"/>
+          </p:nvPr>
+        </p:nvSpPr>
+        <p:spPr>
+          <a:xfrm>
+            <a:off x="149654" y="8525248"/>
+            <a:ext cx="6558690" cy="518390"/>
+          </a:xfrm>
+          <a:ln>
+            <a:solidFill>
+              <a:schemeClr val="tx1"/>
+            </a:solidFill>
+          </a:ln>
+        </p:spPr>
+        <p:txBody>
+          <a:bodyPr anchor="t">
+            <a:noAutofit/>
+          </a:bodyPr>
+          <a:lstStyle/>
+          <a:p>
+            <a:pPr algn="l"/>
+            <a:r>
+              <a:rPr lang="zh-TW" altLang="en-US" sz="1000" b="0" i="0" u="none" strike="noStrike" dirty="0">
+                <a:solidFill>
+                  <a:srgbClr val="000000"/>
+                </a:solidFill>
+                <a:effectLst/>
+                <a:latin typeface="Arial" panose="020B0604020202020204" pitchFamily="34" charset="0"/>
+                <a:cs typeface="Arial" panose="020B0604020202020204" pitchFamily="34" charset="0"/>
+              </a:rPr>
+              <a:t>免責聲明</a:t>
+            </a:r>
+            <a:r>
+              <a:rPr lang="en-US" altLang="zh-TW" sz="1000" b="0" i="0" u="none" strike="noStrike" dirty="0">
+                <a:solidFill>
+                  <a:srgbClr val="000000"/>
+                </a:solidFill>
+                <a:effectLst/>
+                <a:latin typeface="Arial" panose="020B0604020202020204" pitchFamily="34" charset="0"/>
+                <a:cs typeface="Arial" panose="020B0604020202020204" pitchFamily="34" charset="0"/>
+              </a:rPr>
+              <a:t>:</a:t>
+            </a:r>
+            <a:r>
+              <a:rPr lang="zh-TW" altLang="en-US" sz="1000" b="0" i="0" u="none" strike="noStrike" dirty="0">
+                <a:solidFill>
+                  <a:srgbClr val="000000"/>
+                </a:solidFill>
+                <a:effectLst/>
+                <a:latin typeface="Arial" panose="020B0604020202020204" pitchFamily="34" charset="0"/>
+                <a:cs typeface="Arial" panose="020B0604020202020204" pitchFamily="34" charset="0"/>
+              </a:rPr>
+              <a:t>以下提供的資訊皆為學術研究結果，並非投資意見。此外一切圖片和數據版權所有，未經本台同意切勿分享。</a:t>
+            </a:r>
+            <a:r>
+              <a:rPr lang="en-US" altLang="zh-TW" sz="1000" b="0" i="0" u="none" strike="noStrike" dirty="0">
+                <a:solidFill>
+                  <a:srgbClr val="000000"/>
+                </a:solidFill>
+                <a:effectLst/>
+                <a:latin typeface="Arial" panose="020B0604020202020204" pitchFamily="34" charset="0"/>
+                <a:cs typeface="Arial" panose="020B0604020202020204" pitchFamily="34" charset="0"/>
+              </a:rPr>
+              <a:t>Disclaimer: The information provided below is the result of academic research and is not investment advice. In addition, all pictures and data are copyrighted and should not be shared without the consent of this station.</a:t>
+            </a:r>
+            <a:endParaRPr lang="en-CA" sz="1000" dirty="0">
+              <a:solidFill>
+                <a:srgbClr val="000000"/>
+              </a:solidFill>
+              <a:latin typeface="Arial" panose="020B0604020202020204" pitchFamily="34" charset="0"/>
+              <a:cs typeface="Arial" panose="020B0604020202020204" pitchFamily="34" charset="0"/>
+            </a:endParaRPr>
           </a:p>
         </p:txBody>
       </p:sp>

</xml_diff>